<commit_message>
Added the GameAssets resource. It will hold every handle of any loaded asset and provides them when needed. Currently, only pacmans sprite sheets are registered.
Added the Loading lifecycle state. It runs before Start and simply loads all assets.
</commit_message>
<xml_diff>
--- a/resources/lifecycle.pptx
+++ b/resources/lifecycle.pptx
@@ -104,6 +104,11 @@
       </a:defRPr>
     </a:lvl9pPr>
   </p:defaultTextStyle>
+  <p:extLst>
+    <p:ext uri="{EFAFB233-063F-42B5-8137-9DF3F51BA10A}">
+      <p15:sldGuideLst xmlns:p15="http://schemas.microsoft.com/office/powerpoint/2012/main"/>
+    </p:ext>
+  </p:extLst>
 </p:presentation>
 </file>
 
@@ -254,7 +259,7 @@
           <a:p>
             <a:fld id="{57827AC0-08BB-40AB-9832-358A4E9B3FA3}" type="datetimeFigureOut">
               <a:rPr lang="de-DE" smtClean="0"/>
-              <a:t>30.07.2022</a:t>
+              <a:t>06.08.2022</a:t>
             </a:fld>
             <a:endParaRPr lang="de-DE"/>
           </a:p>
@@ -452,7 +457,7 @@
           <a:p>
             <a:fld id="{57827AC0-08BB-40AB-9832-358A4E9B3FA3}" type="datetimeFigureOut">
               <a:rPr lang="de-DE" smtClean="0"/>
-              <a:t>30.07.2022</a:t>
+              <a:t>06.08.2022</a:t>
             </a:fld>
             <a:endParaRPr lang="de-DE"/>
           </a:p>
@@ -660,7 +665,7 @@
           <a:p>
             <a:fld id="{57827AC0-08BB-40AB-9832-358A4E9B3FA3}" type="datetimeFigureOut">
               <a:rPr lang="de-DE" smtClean="0"/>
-              <a:t>30.07.2022</a:t>
+              <a:t>06.08.2022</a:t>
             </a:fld>
             <a:endParaRPr lang="de-DE"/>
           </a:p>
@@ -858,7 +863,7 @@
           <a:p>
             <a:fld id="{57827AC0-08BB-40AB-9832-358A4E9B3FA3}" type="datetimeFigureOut">
               <a:rPr lang="de-DE" smtClean="0"/>
-              <a:t>30.07.2022</a:t>
+              <a:t>06.08.2022</a:t>
             </a:fld>
             <a:endParaRPr lang="de-DE"/>
           </a:p>
@@ -1133,7 +1138,7 @@
           <a:p>
             <a:fld id="{57827AC0-08BB-40AB-9832-358A4E9B3FA3}" type="datetimeFigureOut">
               <a:rPr lang="de-DE" smtClean="0"/>
-              <a:t>30.07.2022</a:t>
+              <a:t>06.08.2022</a:t>
             </a:fld>
             <a:endParaRPr lang="de-DE"/>
           </a:p>
@@ -1398,7 +1403,7 @@
           <a:p>
             <a:fld id="{57827AC0-08BB-40AB-9832-358A4E9B3FA3}" type="datetimeFigureOut">
               <a:rPr lang="de-DE" smtClean="0"/>
-              <a:t>30.07.2022</a:t>
+              <a:t>06.08.2022</a:t>
             </a:fld>
             <a:endParaRPr lang="de-DE"/>
           </a:p>
@@ -1810,7 +1815,7 @@
           <a:p>
             <a:fld id="{57827AC0-08BB-40AB-9832-358A4E9B3FA3}" type="datetimeFigureOut">
               <a:rPr lang="de-DE" smtClean="0"/>
-              <a:t>30.07.2022</a:t>
+              <a:t>06.08.2022</a:t>
             </a:fld>
             <a:endParaRPr lang="de-DE"/>
           </a:p>
@@ -1951,7 +1956,7 @@
           <a:p>
             <a:fld id="{57827AC0-08BB-40AB-9832-358A4E9B3FA3}" type="datetimeFigureOut">
               <a:rPr lang="de-DE" smtClean="0"/>
-              <a:t>30.07.2022</a:t>
+              <a:t>06.08.2022</a:t>
             </a:fld>
             <a:endParaRPr lang="de-DE"/>
           </a:p>
@@ -2064,7 +2069,7 @@
           <a:p>
             <a:fld id="{57827AC0-08BB-40AB-9832-358A4E9B3FA3}" type="datetimeFigureOut">
               <a:rPr lang="de-DE" smtClean="0"/>
-              <a:t>30.07.2022</a:t>
+              <a:t>06.08.2022</a:t>
             </a:fld>
             <a:endParaRPr lang="de-DE"/>
           </a:p>
@@ -2375,7 +2380,7 @@
           <a:p>
             <a:fld id="{57827AC0-08BB-40AB-9832-358A4E9B3FA3}" type="datetimeFigureOut">
               <a:rPr lang="de-DE" smtClean="0"/>
-              <a:t>30.07.2022</a:t>
+              <a:t>06.08.2022</a:t>
             </a:fld>
             <a:endParaRPr lang="de-DE"/>
           </a:p>
@@ -2663,7 +2668,7 @@
           <a:p>
             <a:fld id="{57827AC0-08BB-40AB-9832-358A4E9B3FA3}" type="datetimeFigureOut">
               <a:rPr lang="de-DE" smtClean="0"/>
-              <a:t>30.07.2022</a:t>
+              <a:t>06.08.2022</a:t>
             </a:fld>
             <a:endParaRPr lang="de-DE"/>
           </a:p>
@@ -2904,7 +2909,7 @@
           <a:p>
             <a:fld id="{57827AC0-08BB-40AB-9832-358A4E9B3FA3}" type="datetimeFigureOut">
               <a:rPr lang="de-DE" smtClean="0"/>
-              <a:t>30.07.2022</a:t>
+              <a:t>06.08.2022</a:t>
             </a:fld>
             <a:endParaRPr lang="de-DE"/>
           </a:p>
@@ -3335,7 +3340,7 @@
         </p:nvSpPr>
         <p:spPr>
           <a:xfrm>
-            <a:off x="3455438" y="3858193"/>
+            <a:off x="4487284" y="3975639"/>
             <a:ext cx="914400" cy="377119"/>
           </a:xfrm>
           <a:prstGeom prst="rect">
@@ -3396,7 +3401,7 @@
         </p:nvSpPr>
         <p:spPr>
           <a:xfrm>
-            <a:off x="4486470" y="1566125"/>
+            <a:off x="5518316" y="1683571"/>
             <a:ext cx="1013926" cy="377119"/>
           </a:xfrm>
           <a:prstGeom prst="rect">
@@ -3457,7 +3462,7 @@
         </p:nvSpPr>
         <p:spPr>
           <a:xfrm>
-            <a:off x="8895184" y="1193670"/>
+            <a:off x="9927030" y="1311116"/>
             <a:ext cx="914400" cy="377119"/>
           </a:xfrm>
           <a:prstGeom prst="rect">
@@ -3518,7 +3523,7 @@
         </p:nvSpPr>
         <p:spPr>
           <a:xfrm>
-            <a:off x="9551438" y="3314112"/>
+            <a:off x="10583284" y="3431558"/>
             <a:ext cx="914400" cy="377119"/>
           </a:xfrm>
           <a:prstGeom prst="rect">
@@ -3584,7 +3589,7 @@
         </p:nvSpPr>
         <p:spPr>
           <a:xfrm>
-            <a:off x="7822163" y="5098651"/>
+            <a:off x="8854009" y="5216097"/>
             <a:ext cx="914400" cy="377119"/>
           </a:xfrm>
           <a:prstGeom prst="rect">
@@ -3645,7 +3650,7 @@
         </p:nvSpPr>
         <p:spPr>
           <a:xfrm>
-            <a:off x="4904792" y="5910203"/>
+            <a:off x="5936638" y="6027649"/>
             <a:ext cx="1191208" cy="377119"/>
           </a:xfrm>
           <a:prstGeom prst="rect">
@@ -3714,7 +3719,7 @@
         </p:nvCxnSpPr>
         <p:spPr>
           <a:xfrm flipV="1">
-            <a:off x="3912638" y="1943244"/>
+            <a:off x="4944484" y="2060690"/>
             <a:ext cx="1080795" cy="1914949"/>
           </a:xfrm>
           <a:prstGeom prst="straightConnector1">
@@ -3756,7 +3761,7 @@
         </p:nvCxnSpPr>
         <p:spPr>
           <a:xfrm flipV="1">
-            <a:off x="5500396" y="1382230"/>
+            <a:off x="6532242" y="1499676"/>
             <a:ext cx="3394788" cy="372455"/>
           </a:xfrm>
           <a:prstGeom prst="straightConnector1">
@@ -3798,7 +3803,7 @@
         </p:nvCxnSpPr>
         <p:spPr>
           <a:xfrm>
-            <a:off x="9352384" y="1570789"/>
+            <a:off x="10384230" y="1688235"/>
             <a:ext cx="656254" cy="1743323"/>
           </a:xfrm>
           <a:prstGeom prst="straightConnector1">
@@ -3840,7 +3845,7 @@
         </p:nvCxnSpPr>
         <p:spPr>
           <a:xfrm flipH="1">
-            <a:off x="8279363" y="3691231"/>
+            <a:off x="9311209" y="3808677"/>
             <a:ext cx="1729275" cy="1407420"/>
           </a:xfrm>
           <a:prstGeom prst="straightConnector1">
@@ -3882,7 +3887,7 @@
         </p:nvCxnSpPr>
         <p:spPr>
           <a:xfrm flipH="1" flipV="1">
-            <a:off x="4369838" y="4046753"/>
+            <a:off x="5401684" y="4164199"/>
             <a:ext cx="3452325" cy="1240458"/>
           </a:xfrm>
           <a:prstGeom prst="straightConnector1">
@@ -3924,7 +3929,7 @@
         </p:nvCxnSpPr>
         <p:spPr>
           <a:xfrm flipH="1">
-            <a:off x="6096000" y="5287211"/>
+            <a:off x="7127846" y="5404657"/>
             <a:ext cx="1726163" cy="811552"/>
           </a:xfrm>
           <a:prstGeom prst="straightConnector1">
@@ -3963,7 +3968,7 @@
         </p:nvSpPr>
         <p:spPr>
           <a:xfrm>
-            <a:off x="762003" y="3872174"/>
+            <a:off x="1793849" y="3989620"/>
             <a:ext cx="914400" cy="377119"/>
           </a:xfrm>
           <a:prstGeom prst="rect">
@@ -4028,7 +4033,7 @@
         </p:nvCxnSpPr>
         <p:spPr>
           <a:xfrm flipV="1">
-            <a:off x="1676403" y="4046753"/>
+            <a:off x="2708249" y="4164199"/>
             <a:ext cx="1779035" cy="13981"/>
           </a:xfrm>
           <a:prstGeom prst="straightConnector1">
@@ -4067,7 +4072,7 @@
         </p:nvSpPr>
         <p:spPr>
           <a:xfrm>
-            <a:off x="634482" y="1557023"/>
+            <a:off x="1666328" y="1674469"/>
             <a:ext cx="1687285" cy="377119"/>
           </a:xfrm>
           <a:prstGeom prst="rect">
@@ -4136,7 +4141,7 @@
         </p:nvCxnSpPr>
         <p:spPr>
           <a:xfrm flipH="1" flipV="1">
-            <a:off x="2321767" y="1745583"/>
+            <a:off x="3353613" y="1863029"/>
             <a:ext cx="2164703" cy="9102"/>
           </a:xfrm>
           <a:prstGeom prst="straightConnector1">
@@ -4178,7 +4183,7 @@
         </p:nvCxnSpPr>
         <p:spPr>
           <a:xfrm>
-            <a:off x="1478125" y="1934142"/>
+            <a:off x="2509971" y="2051588"/>
             <a:ext cx="2434513" cy="1924051"/>
           </a:xfrm>
           <a:prstGeom prst="straightConnector1">
@@ -4217,7 +4222,7 @@
         </p:nvSpPr>
         <p:spPr>
           <a:xfrm>
-            <a:off x="2724278" y="1349989"/>
+            <a:off x="3756124" y="1467435"/>
             <a:ext cx="1475276" cy="369332"/>
           </a:xfrm>
           <a:prstGeom prst="rect">
@@ -4265,7 +4270,7 @@
         </p:nvSpPr>
         <p:spPr>
           <a:xfrm>
-            <a:off x="1219203" y="2480189"/>
+            <a:off x="2251049" y="2597635"/>
             <a:ext cx="1558989" cy="923330"/>
           </a:xfrm>
           <a:prstGeom prst="rect">
@@ -4317,7 +4322,7 @@
         </p:nvSpPr>
         <p:spPr>
           <a:xfrm>
-            <a:off x="5964480" y="1103284"/>
+            <a:off x="6996326" y="1220730"/>
             <a:ext cx="2491388" cy="369332"/>
           </a:xfrm>
           <a:prstGeom prst="rect">
@@ -4368,7 +4373,7 @@
         </p:nvSpPr>
         <p:spPr>
           <a:xfrm>
-            <a:off x="4663915" y="2757188"/>
+            <a:off x="5695761" y="2874634"/>
             <a:ext cx="2020810" cy="369332"/>
           </a:xfrm>
           <a:prstGeom prst="rect">
@@ -4416,7 +4421,7 @@
         </p:nvSpPr>
         <p:spPr>
           <a:xfrm>
-            <a:off x="9809584" y="2071396"/>
+            <a:off x="10841430" y="2188842"/>
             <a:ext cx="1247192" cy="646331"/>
           </a:xfrm>
           <a:prstGeom prst="rect">
@@ -4464,7 +4469,7 @@
         </p:nvSpPr>
         <p:spPr>
           <a:xfrm>
-            <a:off x="9249745" y="4192608"/>
+            <a:off x="10281591" y="4310054"/>
             <a:ext cx="1247191" cy="923330"/>
           </a:xfrm>
           <a:prstGeom prst="rect">
@@ -4520,7 +4525,7 @@
         </p:nvSpPr>
         <p:spPr>
           <a:xfrm>
-            <a:off x="5319261" y="4164608"/>
+            <a:off x="6351107" y="4282054"/>
             <a:ext cx="2810000" cy="369332"/>
           </a:xfrm>
           <a:prstGeom prst="rect">
@@ -4584,7 +4589,7 @@
         </p:nvSpPr>
         <p:spPr>
           <a:xfrm>
-            <a:off x="6892871" y="5739980"/>
+            <a:off x="7924717" y="5857426"/>
             <a:ext cx="2251129" cy="369332"/>
           </a:xfrm>
           <a:prstGeom prst="rect">
@@ -4648,7 +4653,7 @@
         </p:nvSpPr>
         <p:spPr>
           <a:xfrm>
-            <a:off x="1569512" y="4244418"/>
+            <a:off x="2601358" y="4361864"/>
             <a:ext cx="2020810" cy="369332"/>
           </a:xfrm>
           <a:prstGeom prst="rect">
@@ -4677,6 +4682,163 @@
             <a:r>
               <a:rPr lang="de-DE" dirty="0" err="1"/>
               <a:t>finished</a:t>
+            </a:r>
+            <a:endParaRPr lang="de-DE" dirty="0"/>
+          </a:p>
+        </p:txBody>
+      </p:sp>
+      <p:sp>
+        <p:nvSpPr>
+          <p:cNvPr id="29" name="Rechteck 28">
+            <a:extLst>
+              <a:ext uri="{FF2B5EF4-FFF2-40B4-BE49-F238E27FC236}">
+                <a16:creationId xmlns:a16="http://schemas.microsoft.com/office/drawing/2014/main" id="{5D0C9500-8E49-5606-F6E9-8F03B5B119A2}"/>
+              </a:ext>
+            </a:extLst>
+          </p:cNvPr>
+          <p:cNvSpPr/>
+          <p:nvPr/>
+        </p:nvSpPr>
+        <p:spPr>
+          <a:xfrm>
+            <a:off x="150884" y="3989640"/>
+            <a:ext cx="914400" cy="377119"/>
+          </a:xfrm>
+          <a:prstGeom prst="rect">
+            <a:avLst/>
+          </a:prstGeom>
+          <a:solidFill>
+            <a:schemeClr val="bg1"/>
+          </a:solidFill>
+          <a:ln>
+            <a:solidFill>
+              <a:schemeClr val="tx1"/>
+            </a:solidFill>
+          </a:ln>
+        </p:spPr>
+        <p:style>
+          <a:lnRef idx="2">
+            <a:schemeClr val="accent1">
+              <a:shade val="50000"/>
+            </a:schemeClr>
+          </a:lnRef>
+          <a:fillRef idx="1">
+            <a:schemeClr val="accent1"/>
+          </a:fillRef>
+          <a:effectRef idx="0">
+            <a:schemeClr val="accent1"/>
+          </a:effectRef>
+          <a:fontRef idx="minor">
+            <a:schemeClr val="lt1"/>
+          </a:fontRef>
+        </p:style>
+        <p:txBody>
+          <a:bodyPr rtlCol="0" anchor="ctr"/>
+          <a:lstStyle/>
+          <a:p>
+            <a:pPr algn="ctr"/>
+            <a:r>
+              <a:rPr lang="de-DE" dirty="0" err="1">
+                <a:solidFill>
+                  <a:schemeClr val="tx1"/>
+                </a:solidFill>
+              </a:rPr>
+              <a:t>Loading</a:t>
+            </a:r>
+            <a:endParaRPr lang="de-DE" dirty="0">
+              <a:solidFill>
+                <a:schemeClr val="tx1"/>
+              </a:solidFill>
+            </a:endParaRPr>
+          </a:p>
+        </p:txBody>
+      </p:sp>
+      <p:cxnSp>
+        <p:nvCxnSpPr>
+          <p:cNvPr id="30" name="Gerade Verbindung mit Pfeil 29">
+            <a:extLst>
+              <a:ext uri="{FF2B5EF4-FFF2-40B4-BE49-F238E27FC236}">
+                <a16:creationId xmlns:a16="http://schemas.microsoft.com/office/drawing/2014/main" id="{21D15BF0-9B23-651B-E72B-F51BAA7FE314}"/>
+              </a:ext>
+            </a:extLst>
+          </p:cNvPr>
+          <p:cNvCxnSpPr>
+            <a:cxnSpLocks/>
+            <a:stCxn id="29" idx="3"/>
+            <a:endCxn id="26" idx="1"/>
+          </p:cNvCxnSpPr>
+          <p:nvPr/>
+        </p:nvCxnSpPr>
+        <p:spPr>
+          <a:xfrm flipV="1">
+            <a:off x="1065284" y="4178180"/>
+            <a:ext cx="728565" cy="20"/>
+          </a:xfrm>
+          <a:prstGeom prst="straightConnector1">
+            <a:avLst/>
+          </a:prstGeom>
+          <a:ln>
+            <a:tailEnd type="triangle"/>
+          </a:ln>
+        </p:spPr>
+        <p:style>
+          <a:lnRef idx="1">
+            <a:schemeClr val="dk1"/>
+          </a:lnRef>
+          <a:fillRef idx="0">
+            <a:schemeClr val="dk1"/>
+          </a:fillRef>
+          <a:effectRef idx="0">
+            <a:schemeClr val="dk1"/>
+          </a:effectRef>
+          <a:fontRef idx="minor">
+            <a:schemeClr val="tx1"/>
+          </a:fontRef>
+        </p:style>
+      </p:cxnSp>
+      <p:sp>
+        <p:nvSpPr>
+          <p:cNvPr id="10" name="Textfeld 9">
+            <a:extLst>
+              <a:ext uri="{FF2B5EF4-FFF2-40B4-BE49-F238E27FC236}">
+                <a16:creationId xmlns:a16="http://schemas.microsoft.com/office/drawing/2014/main" id="{DF9FE9B0-A981-ED7E-797B-5B8C9DBCAB85}"/>
+              </a:ext>
+            </a:extLst>
+          </p:cNvPr>
+          <p:cNvSpPr txBox="1"/>
+          <p:nvPr/>
+        </p:nvSpPr>
+        <p:spPr>
+          <a:xfrm>
+            <a:off x="648928" y="3624011"/>
+            <a:ext cx="1744773" cy="369332"/>
+          </a:xfrm>
+          <a:prstGeom prst="rect">
+            <a:avLst/>
+          </a:prstGeom>
+          <a:noFill/>
+        </p:spPr>
+        <p:txBody>
+          <a:bodyPr wrap="none" rtlCol="0">
+            <a:spAutoFit/>
+          </a:bodyPr>
+          <a:lstStyle/>
+          <a:p>
+            <a:r>
+              <a:rPr lang="de-DE" dirty="0"/>
+              <a:t>All </a:t>
+            </a:r>
+            <a:r>
+              <a:rPr lang="de-DE" dirty="0" err="1"/>
+              <a:t>assets</a:t>
+            </a:r>
+            <a:r>
+              <a:rPr lang="de-DE" dirty="0"/>
+              <a:t> </a:t>
+            </a:r>
+            <a:r>
+              <a:rPr lang="de-DE" dirty="0" err="1"/>
+              <a:t>loaded</a:t>
             </a:r>
             <a:endParaRPr lang="de-DE" dirty="0"/>
           </a:p>

</xml_diff>

<commit_message>
The Pause when a ghost was eaten is now handled by a new state.
</commit_message>
<xml_diff>
--- a/resources/lifecycle.pptx
+++ b/resources/lifecycle.pptx
@@ -259,7 +259,7 @@
           <a:p>
             <a:fld id="{57827AC0-08BB-40AB-9832-358A4E9B3FA3}" type="datetimeFigureOut">
               <a:rPr lang="de-DE" smtClean="0"/>
-              <a:t>06.08.2022</a:t>
+              <a:t>25.09.2022</a:t>
             </a:fld>
             <a:endParaRPr lang="de-DE"/>
           </a:p>
@@ -457,7 +457,7 @@
           <a:p>
             <a:fld id="{57827AC0-08BB-40AB-9832-358A4E9B3FA3}" type="datetimeFigureOut">
               <a:rPr lang="de-DE" smtClean="0"/>
-              <a:t>06.08.2022</a:t>
+              <a:t>25.09.2022</a:t>
             </a:fld>
             <a:endParaRPr lang="de-DE"/>
           </a:p>
@@ -665,7 +665,7 @@
           <a:p>
             <a:fld id="{57827AC0-08BB-40AB-9832-358A4E9B3FA3}" type="datetimeFigureOut">
               <a:rPr lang="de-DE" smtClean="0"/>
-              <a:t>06.08.2022</a:t>
+              <a:t>25.09.2022</a:t>
             </a:fld>
             <a:endParaRPr lang="de-DE"/>
           </a:p>
@@ -863,7 +863,7 @@
           <a:p>
             <a:fld id="{57827AC0-08BB-40AB-9832-358A4E9B3FA3}" type="datetimeFigureOut">
               <a:rPr lang="de-DE" smtClean="0"/>
-              <a:t>06.08.2022</a:t>
+              <a:t>25.09.2022</a:t>
             </a:fld>
             <a:endParaRPr lang="de-DE"/>
           </a:p>
@@ -1138,7 +1138,7 @@
           <a:p>
             <a:fld id="{57827AC0-08BB-40AB-9832-358A4E9B3FA3}" type="datetimeFigureOut">
               <a:rPr lang="de-DE" smtClean="0"/>
-              <a:t>06.08.2022</a:t>
+              <a:t>25.09.2022</a:t>
             </a:fld>
             <a:endParaRPr lang="de-DE"/>
           </a:p>
@@ -1403,7 +1403,7 @@
           <a:p>
             <a:fld id="{57827AC0-08BB-40AB-9832-358A4E9B3FA3}" type="datetimeFigureOut">
               <a:rPr lang="de-DE" smtClean="0"/>
-              <a:t>06.08.2022</a:t>
+              <a:t>25.09.2022</a:t>
             </a:fld>
             <a:endParaRPr lang="de-DE"/>
           </a:p>
@@ -1815,7 +1815,7 @@
           <a:p>
             <a:fld id="{57827AC0-08BB-40AB-9832-358A4E9B3FA3}" type="datetimeFigureOut">
               <a:rPr lang="de-DE" smtClean="0"/>
-              <a:t>06.08.2022</a:t>
+              <a:t>25.09.2022</a:t>
             </a:fld>
             <a:endParaRPr lang="de-DE"/>
           </a:p>
@@ -1956,7 +1956,7 @@
           <a:p>
             <a:fld id="{57827AC0-08BB-40AB-9832-358A4E9B3FA3}" type="datetimeFigureOut">
               <a:rPr lang="de-DE" smtClean="0"/>
-              <a:t>06.08.2022</a:t>
+              <a:t>25.09.2022</a:t>
             </a:fld>
             <a:endParaRPr lang="de-DE"/>
           </a:p>
@@ -2069,7 +2069,7 @@
           <a:p>
             <a:fld id="{57827AC0-08BB-40AB-9832-358A4E9B3FA3}" type="datetimeFigureOut">
               <a:rPr lang="de-DE" smtClean="0"/>
-              <a:t>06.08.2022</a:t>
+              <a:t>25.09.2022</a:t>
             </a:fld>
             <a:endParaRPr lang="de-DE"/>
           </a:p>
@@ -2380,7 +2380,7 @@
           <a:p>
             <a:fld id="{57827AC0-08BB-40AB-9832-358A4E9B3FA3}" type="datetimeFigureOut">
               <a:rPr lang="de-DE" smtClean="0"/>
-              <a:t>06.08.2022</a:t>
+              <a:t>25.09.2022</a:t>
             </a:fld>
             <a:endParaRPr lang="de-DE"/>
           </a:p>
@@ -2668,7 +2668,7 @@
           <a:p>
             <a:fld id="{57827AC0-08BB-40AB-9832-358A4E9B3FA3}" type="datetimeFigureOut">
               <a:rPr lang="de-DE" smtClean="0"/>
-              <a:t>06.08.2022</a:t>
+              <a:t>25.09.2022</a:t>
             </a:fld>
             <a:endParaRPr lang="de-DE"/>
           </a:p>
@@ -2909,7 +2909,7 @@
           <a:p>
             <a:fld id="{57827AC0-08BB-40AB-9832-358A4E9B3FA3}" type="datetimeFigureOut">
               <a:rPr lang="de-DE" smtClean="0"/>
-              <a:t>06.08.2022</a:t>
+              <a:t>25.09.2022</a:t>
             </a:fld>
             <a:endParaRPr lang="de-DE"/>
           </a:p>
@@ -4844,6 +4844,230 @@
           </a:p>
         </p:txBody>
       </p:sp>
+      <p:sp>
+        <p:nvSpPr>
+          <p:cNvPr id="2" name="Rechteck 1">
+            <a:extLst>
+              <a:ext uri="{FF2B5EF4-FFF2-40B4-BE49-F238E27FC236}">
+                <a16:creationId xmlns:a16="http://schemas.microsoft.com/office/drawing/2014/main" id="{ADFA6139-3143-781C-0081-07A5140232A9}"/>
+              </a:ext>
+            </a:extLst>
+          </p:cNvPr>
+          <p:cNvSpPr/>
+          <p:nvPr/>
+        </p:nvSpPr>
+        <p:spPr>
+          <a:xfrm>
+            <a:off x="5110059" y="218227"/>
+            <a:ext cx="1830440" cy="377119"/>
+          </a:xfrm>
+          <a:prstGeom prst="rect">
+            <a:avLst/>
+          </a:prstGeom>
+          <a:solidFill>
+            <a:schemeClr val="bg1"/>
+          </a:solidFill>
+          <a:ln>
+            <a:solidFill>
+              <a:schemeClr val="tx1"/>
+            </a:solidFill>
+          </a:ln>
+        </p:spPr>
+        <p:style>
+          <a:lnRef idx="2">
+            <a:schemeClr val="accent1">
+              <a:shade val="50000"/>
+            </a:schemeClr>
+          </a:lnRef>
+          <a:fillRef idx="1">
+            <a:schemeClr val="accent1"/>
+          </a:fillRef>
+          <a:effectRef idx="0">
+            <a:schemeClr val="accent1"/>
+          </a:effectRef>
+          <a:fontRef idx="minor">
+            <a:schemeClr val="lt1"/>
+          </a:fontRef>
+        </p:style>
+        <p:txBody>
+          <a:bodyPr rtlCol="0" anchor="ctr"/>
+          <a:lstStyle/>
+          <a:p>
+            <a:pPr algn="ctr"/>
+            <a:r>
+              <a:rPr lang="de-DE" dirty="0" err="1">
+                <a:solidFill>
+                  <a:schemeClr val="tx1"/>
+                </a:solidFill>
+              </a:rPr>
+              <a:t>GhostEatenPause</a:t>
+            </a:r>
+            <a:endParaRPr lang="de-DE" dirty="0">
+              <a:solidFill>
+                <a:schemeClr val="tx1"/>
+              </a:solidFill>
+            </a:endParaRPr>
+          </a:p>
+        </p:txBody>
+      </p:sp>
+      <p:cxnSp>
+        <p:nvCxnSpPr>
+          <p:cNvPr id="12" name="Gerade Verbindung mit Pfeil 11">
+            <a:extLst>
+              <a:ext uri="{FF2B5EF4-FFF2-40B4-BE49-F238E27FC236}">
+                <a16:creationId xmlns:a16="http://schemas.microsoft.com/office/drawing/2014/main" id="{A8C6D7FA-7649-39E6-3393-34D88555240F}"/>
+              </a:ext>
+            </a:extLst>
+          </p:cNvPr>
+          <p:cNvCxnSpPr/>
+          <p:nvPr/>
+        </p:nvCxnSpPr>
+        <p:spPr>
+          <a:xfrm flipV="1">
+            <a:off x="6434356" y="595346"/>
+            <a:ext cx="0" cy="1079123"/>
+          </a:xfrm>
+          <a:prstGeom prst="straightConnector1">
+            <a:avLst/>
+          </a:prstGeom>
+          <a:ln>
+            <a:tailEnd type="triangle"/>
+          </a:ln>
+        </p:spPr>
+        <p:style>
+          <a:lnRef idx="1">
+            <a:schemeClr val="dk1"/>
+          </a:lnRef>
+          <a:fillRef idx="0">
+            <a:schemeClr val="dk1"/>
+          </a:fillRef>
+          <a:effectRef idx="0">
+            <a:schemeClr val="dk1"/>
+          </a:effectRef>
+          <a:fontRef idx="minor">
+            <a:schemeClr val="tx1"/>
+          </a:fontRef>
+        </p:style>
+      </p:cxnSp>
+      <p:cxnSp>
+        <p:nvCxnSpPr>
+          <p:cNvPr id="16" name="Gerade Verbindung mit Pfeil 15">
+            <a:extLst>
+              <a:ext uri="{FF2B5EF4-FFF2-40B4-BE49-F238E27FC236}">
+                <a16:creationId xmlns:a16="http://schemas.microsoft.com/office/drawing/2014/main" id="{E2D411AC-F4C3-3CCC-A66E-752B1C809A9E}"/>
+              </a:ext>
+            </a:extLst>
+          </p:cNvPr>
+          <p:cNvCxnSpPr/>
+          <p:nvPr/>
+        </p:nvCxnSpPr>
+        <p:spPr>
+          <a:xfrm>
+            <a:off x="5695761" y="595346"/>
+            <a:ext cx="0" cy="1088225"/>
+          </a:xfrm>
+          <a:prstGeom prst="straightConnector1">
+            <a:avLst/>
+          </a:prstGeom>
+          <a:ln>
+            <a:tailEnd type="triangle"/>
+          </a:ln>
+        </p:spPr>
+        <p:style>
+          <a:lnRef idx="1">
+            <a:schemeClr val="dk1"/>
+          </a:lnRef>
+          <a:fillRef idx="0">
+            <a:schemeClr val="dk1"/>
+          </a:fillRef>
+          <a:effectRef idx="0">
+            <a:schemeClr val="dk1"/>
+          </a:effectRef>
+          <a:fontRef idx="minor">
+            <a:schemeClr val="tx1"/>
+          </a:fontRef>
+        </p:style>
+      </p:cxnSp>
+      <p:sp>
+        <p:nvSpPr>
+          <p:cNvPr id="18" name="Textfeld 17">
+            <a:extLst>
+              <a:ext uri="{FF2B5EF4-FFF2-40B4-BE49-F238E27FC236}">
+                <a16:creationId xmlns:a16="http://schemas.microsoft.com/office/drawing/2014/main" id="{8B9F8823-DD57-D5A7-F18E-A299277E99BA}"/>
+              </a:ext>
+            </a:extLst>
+          </p:cNvPr>
+          <p:cNvSpPr txBox="1"/>
+          <p:nvPr/>
+        </p:nvSpPr>
+        <p:spPr>
+          <a:xfrm>
+            <a:off x="6434356" y="678179"/>
+            <a:ext cx="1289969" cy="369332"/>
+          </a:xfrm>
+          <a:prstGeom prst="rect">
+            <a:avLst/>
+          </a:prstGeom>
+          <a:noFill/>
+        </p:spPr>
+        <p:txBody>
+          <a:bodyPr wrap="none" rtlCol="0">
+            <a:spAutoFit/>
+          </a:bodyPr>
+          <a:lstStyle/>
+          <a:p>
+            <a:r>
+              <a:rPr lang="de-DE" dirty="0"/>
+              <a:t>ghost </a:t>
+            </a:r>
+            <a:r>
+              <a:rPr lang="de-DE" dirty="0" err="1"/>
+              <a:t>eaten</a:t>
+            </a:r>
+            <a:endParaRPr lang="de-DE" dirty="0"/>
+          </a:p>
+        </p:txBody>
+      </p:sp>
+      <p:sp>
+        <p:nvSpPr>
+          <p:cNvPr id="20" name="Textfeld 19">
+            <a:extLst>
+              <a:ext uri="{FF2B5EF4-FFF2-40B4-BE49-F238E27FC236}">
+                <a16:creationId xmlns:a16="http://schemas.microsoft.com/office/drawing/2014/main" id="{BF3E6866-FBC8-90B4-16D3-7600E363C559}"/>
+              </a:ext>
+            </a:extLst>
+          </p:cNvPr>
+          <p:cNvSpPr txBox="1"/>
+          <p:nvPr/>
+        </p:nvSpPr>
+        <p:spPr>
+          <a:xfrm>
+            <a:off x="4424245" y="696791"/>
+            <a:ext cx="1316386" cy="369332"/>
+          </a:xfrm>
+          <a:prstGeom prst="rect">
+            <a:avLst/>
+          </a:prstGeom>
+          <a:noFill/>
+        </p:spPr>
+        <p:txBody>
+          <a:bodyPr wrap="none" rtlCol="0">
+            <a:spAutoFit/>
+          </a:bodyPr>
+          <a:lstStyle/>
+          <a:p>
+            <a:r>
+              <a:rPr lang="de-DE" dirty="0"/>
+              <a:t>time </a:t>
+            </a:r>
+            <a:r>
+              <a:rPr lang="de-DE" dirty="0" err="1"/>
+              <a:t>passed</a:t>
+            </a:r>
+            <a:endParaRPr lang="de-DE" dirty="0"/>
+          </a:p>
+        </p:txBody>
+      </p:sp>
     </p:spTree>
     <p:extLst>
       <p:ext uri="{BB962C8B-B14F-4D97-AF65-F5344CB8AC3E}">

</xml_diff>